<commit_message>
Almost finished with project presentation.
</commit_message>
<xml_diff>
--- a/Project/KevinKuo - Project Presentation.pptx
+++ b/Project/KevinKuo - Project Presentation.pptx
@@ -117,6 +117,11 @@
       </a:defRPr>
     </a:lvl9pPr>
   </p:defaultTextStyle>
+  <p:extLst>
+    <p:ext uri="{EFAFB233-063F-42B5-8137-9DF3F51BA10A}">
+      <p15:sldGuideLst xmlns:p15="http://schemas.microsoft.com/office/powerpoint/2012/main"/>
+    </p:ext>
+  </p:extLst>
 </p:presentation>
 </file>
 
@@ -202,7 +207,7 @@
           <a:p>
             <a:fld id="{ED4CCED0-97CC-4CC6-95AA-BC631DD8E4EF}" type="datetimeFigureOut">
               <a:rPr lang="en-US" smtClean="0"/>
-              <a:t>5/1/2017</a:t>
+              <a:t>5/2/2017</a:t>
             </a:fld>
             <a:endParaRPr lang="en-US"/>
           </a:p>
@@ -546,8 +551,40 @@
                 <a:ea typeface="+mn-ea"/>
                 <a:cs typeface="+mn-cs"/>
               </a:rPr>
-              <a:t>Middle Class Tax Relief and Job Creation Act (MCTRJC) of 2012 required FirstNet, a government managed next generation public safety communication network initiative known as the First Responder Network Authority, to build, operate, and maintain the first high speed nationwide broadband network dedicated to public safety.</a:t>
-            </a:r>
+              <a:t>Middle Class Tax Relief and Job Creation Act (MCTRJC) of 2012 required FirstNet, a government managed next generation public safety communication network initiative known as the First Responder Network Authority, to build, operate, and maintain the first high speed nationwide broadband network dedicated to public safety</a:t>
+            </a:r>
+            <a:r>
+              <a:rPr lang="en-US" sz="1200" kern="1200" dirty="0" smtClean="0">
+                <a:solidFill>
+                  <a:schemeClr val="tx1"/>
+                </a:solidFill>
+                <a:effectLst/>
+                <a:latin typeface="+mn-lt"/>
+                <a:ea typeface="+mn-ea"/>
+                <a:cs typeface="+mn-cs"/>
+              </a:rPr>
+              <a:t>.</a:t>
+            </a:r>
+            <a:br>
+              <a:rPr lang="en-US" sz="1200" kern="1200" dirty="0" smtClean="0">
+                <a:solidFill>
+                  <a:schemeClr val="tx1"/>
+                </a:solidFill>
+                <a:effectLst/>
+                <a:latin typeface="+mn-lt"/>
+                <a:ea typeface="+mn-ea"/>
+                <a:cs typeface="+mn-cs"/>
+              </a:rPr>
+            </a:br>
+            <a:endParaRPr lang="en-US" sz="1200" kern="1200" dirty="0" smtClean="0">
+              <a:solidFill>
+                <a:schemeClr val="tx1"/>
+              </a:solidFill>
+              <a:effectLst/>
+              <a:latin typeface="+mn-lt"/>
+              <a:ea typeface="+mn-ea"/>
+              <a:cs typeface="+mn-cs"/>
+            </a:endParaRPr>
           </a:p>
           <a:p>
             <a:pPr marL="171450" indent="-171450">
@@ -698,6 +735,463 @@
 </p:notes>
 </file>
 
+<file path=ppt/notesSlides/notesSlide3.xml><?xml version="1.0" encoding="utf-8"?>
+<p:notes xmlns:a="http://schemas.openxmlformats.org/drawingml/2006/main" xmlns:r="http://schemas.openxmlformats.org/officeDocument/2006/relationships" xmlns:p="http://schemas.openxmlformats.org/presentationml/2006/main">
+  <p:cSld>
+    <p:spTree>
+      <p:nvGrpSpPr>
+        <p:cNvPr id="1" name=""/>
+        <p:cNvGrpSpPr/>
+        <p:nvPr/>
+      </p:nvGrpSpPr>
+      <p:grpSpPr>
+        <a:xfrm>
+          <a:off x="0" y="0"/>
+          <a:ext cx="0" cy="0"/>
+          <a:chOff x="0" y="0"/>
+          <a:chExt cx="0" cy="0"/>
+        </a:xfrm>
+      </p:grpSpPr>
+      <p:sp>
+        <p:nvSpPr>
+          <p:cNvPr id="2" name="Slide Image Placeholder 1"/>
+          <p:cNvSpPr>
+            <a:spLocks noGrp="1" noRot="1" noChangeAspect="1"/>
+          </p:cNvSpPr>
+          <p:nvPr>
+            <p:ph type="sldImg"/>
+          </p:nvPr>
+        </p:nvSpPr>
+        <p:spPr/>
+      </p:sp>
+      <p:sp>
+        <p:nvSpPr>
+          <p:cNvPr id="3" name="Notes Placeholder 2"/>
+          <p:cNvSpPr>
+            <a:spLocks noGrp="1"/>
+          </p:cNvSpPr>
+          <p:nvPr>
+            <p:ph type="body" idx="1"/>
+          </p:nvPr>
+        </p:nvSpPr>
+        <p:spPr/>
+        <p:txBody>
+          <a:bodyPr/>
+          <a:lstStyle/>
+          <a:p>
+            <a:r>
+              <a:rPr lang="en-US" dirty="0" smtClean="0"/>
+              <a:t>One important thing:</a:t>
+            </a:r>
+          </a:p>
+          <a:p>
+            <a:endParaRPr lang="en-US" dirty="0" smtClean="0"/>
+          </a:p>
+          <a:p>
+            <a:r>
+              <a:rPr lang="en-US" dirty="0" smtClean="0"/>
+              <a:t>UNCLASSIFIED</a:t>
+            </a:r>
+          </a:p>
+          <a:p>
+            <a:endParaRPr lang="en-US" dirty="0" smtClean="0"/>
+          </a:p>
+          <a:p>
+            <a:r>
+              <a:rPr lang="en-US" dirty="0" smtClean="0"/>
+              <a:t>FirstNet</a:t>
+            </a:r>
+            <a:r>
+              <a:rPr lang="en-US" baseline="0" dirty="0" smtClean="0"/>
+              <a:t> is designed to carry unclassified data.</a:t>
+            </a:r>
+            <a:endParaRPr lang="en-US" dirty="0"/>
+          </a:p>
+        </p:txBody>
+      </p:sp>
+      <p:sp>
+        <p:nvSpPr>
+          <p:cNvPr id="4" name="Slide Number Placeholder 3"/>
+          <p:cNvSpPr>
+            <a:spLocks noGrp="1"/>
+          </p:cNvSpPr>
+          <p:nvPr>
+            <p:ph type="sldNum" sz="quarter" idx="10"/>
+          </p:nvPr>
+        </p:nvSpPr>
+        <p:spPr/>
+        <p:txBody>
+          <a:bodyPr/>
+          <a:lstStyle/>
+          <a:p>
+            <a:fld id="{07C1FDB8-61B4-482D-AF5F-A56619606BBA}" type="slidenum">
+              <a:rPr lang="en-US" smtClean="0"/>
+              <a:t>5</a:t>
+            </a:fld>
+            <a:endParaRPr lang="en-US"/>
+          </a:p>
+        </p:txBody>
+      </p:sp>
+    </p:spTree>
+    <p:extLst>
+      <p:ext uri="{BB962C8B-B14F-4D97-AF65-F5344CB8AC3E}">
+        <p14:creationId xmlns:p14="http://schemas.microsoft.com/office/powerpoint/2010/main" val="1575884462"/>
+      </p:ext>
+    </p:extLst>
+  </p:cSld>
+  <p:clrMapOvr>
+    <a:masterClrMapping/>
+  </p:clrMapOvr>
+</p:notes>
+</file>
+
+<file path=ppt/notesSlides/notesSlide4.xml><?xml version="1.0" encoding="utf-8"?>
+<p:notes xmlns:a="http://schemas.openxmlformats.org/drawingml/2006/main" xmlns:r="http://schemas.openxmlformats.org/officeDocument/2006/relationships" xmlns:p="http://schemas.openxmlformats.org/presentationml/2006/main">
+  <p:cSld>
+    <p:spTree>
+      <p:nvGrpSpPr>
+        <p:cNvPr id="1" name=""/>
+        <p:cNvGrpSpPr/>
+        <p:nvPr/>
+      </p:nvGrpSpPr>
+      <p:grpSpPr>
+        <a:xfrm>
+          <a:off x="0" y="0"/>
+          <a:ext cx="0" cy="0"/>
+          <a:chOff x="0" y="0"/>
+          <a:chExt cx="0" cy="0"/>
+        </a:xfrm>
+      </p:grpSpPr>
+      <p:sp>
+        <p:nvSpPr>
+          <p:cNvPr id="2" name="Slide Image Placeholder 1"/>
+          <p:cNvSpPr>
+            <a:spLocks noGrp="1" noRot="1" noChangeAspect="1"/>
+          </p:cNvSpPr>
+          <p:nvPr>
+            <p:ph type="sldImg"/>
+          </p:nvPr>
+        </p:nvSpPr>
+        <p:spPr/>
+      </p:sp>
+      <p:sp>
+        <p:nvSpPr>
+          <p:cNvPr id="3" name="Notes Placeholder 2"/>
+          <p:cNvSpPr>
+            <a:spLocks noGrp="1"/>
+          </p:cNvSpPr>
+          <p:nvPr>
+            <p:ph type="body" idx="1"/>
+          </p:nvPr>
+        </p:nvSpPr>
+        <p:spPr/>
+        <p:txBody>
+          <a:bodyPr/>
+          <a:lstStyle/>
+          <a:p>
+            <a:r>
+              <a:rPr lang="en-US" dirty="0" smtClean="0"/>
+              <a:t>Representative</a:t>
+            </a:r>
+            <a:r>
+              <a:rPr lang="en-US" baseline="0" dirty="0" smtClean="0"/>
+              <a:t> of the 7 layer Open System Interconnection model</a:t>
+            </a:r>
+          </a:p>
+          <a:p>
+            <a:pPr marL="171450" indent="-171450">
+              <a:buFontTx/>
+              <a:buChar char="-"/>
+            </a:pPr>
+            <a:r>
+              <a:rPr lang="en-US" baseline="0" dirty="0" smtClean="0"/>
+              <a:t>Application</a:t>
+            </a:r>
+          </a:p>
+          <a:p>
+            <a:pPr marL="171450" indent="-171450">
+              <a:buFontTx/>
+              <a:buChar char="-"/>
+            </a:pPr>
+            <a:r>
+              <a:rPr lang="en-US" baseline="0" dirty="0" smtClean="0"/>
+              <a:t>Presentation</a:t>
+            </a:r>
+          </a:p>
+          <a:p>
+            <a:pPr marL="171450" indent="-171450">
+              <a:buFontTx/>
+              <a:buChar char="-"/>
+            </a:pPr>
+            <a:r>
+              <a:rPr lang="en-US" baseline="0" dirty="0" smtClean="0"/>
+              <a:t>Session (VPN)</a:t>
+            </a:r>
+          </a:p>
+          <a:p>
+            <a:pPr marL="171450" indent="-171450">
+              <a:buFontTx/>
+              <a:buChar char="-"/>
+            </a:pPr>
+            <a:r>
+              <a:rPr lang="en-US" baseline="0" dirty="0" smtClean="0"/>
+              <a:t>Transport (IPsec)</a:t>
+            </a:r>
+          </a:p>
+          <a:p>
+            <a:pPr marL="171450" indent="-171450">
+              <a:buFontTx/>
+              <a:buChar char="-"/>
+            </a:pPr>
+            <a:r>
+              <a:rPr lang="en-US" baseline="0" dirty="0" smtClean="0"/>
+              <a:t>Network</a:t>
+            </a:r>
+          </a:p>
+          <a:p>
+            <a:pPr marL="171450" indent="-171450">
+              <a:buFontTx/>
+              <a:buChar char="-"/>
+            </a:pPr>
+            <a:r>
+              <a:rPr lang="en-US" baseline="0" dirty="0" smtClean="0"/>
+              <a:t>Data Link</a:t>
+            </a:r>
+          </a:p>
+          <a:p>
+            <a:pPr marL="171450" indent="-171450">
+              <a:buFontTx/>
+              <a:buChar char="-"/>
+            </a:pPr>
+            <a:r>
+              <a:rPr lang="en-US" baseline="0" dirty="0" smtClean="0"/>
+              <a:t>Physical</a:t>
+            </a:r>
+            <a:endParaRPr lang="en-US" dirty="0"/>
+          </a:p>
+        </p:txBody>
+      </p:sp>
+      <p:sp>
+        <p:nvSpPr>
+          <p:cNvPr id="4" name="Slide Number Placeholder 3"/>
+          <p:cNvSpPr>
+            <a:spLocks noGrp="1"/>
+          </p:cNvSpPr>
+          <p:nvPr>
+            <p:ph type="sldNum" sz="quarter" idx="10"/>
+          </p:nvPr>
+        </p:nvSpPr>
+        <p:spPr/>
+        <p:txBody>
+          <a:bodyPr/>
+          <a:lstStyle/>
+          <a:p>
+            <a:fld id="{07C1FDB8-61B4-482D-AF5F-A56619606BBA}" type="slidenum">
+              <a:rPr lang="en-US" smtClean="0"/>
+              <a:t>6</a:t>
+            </a:fld>
+            <a:endParaRPr lang="en-US"/>
+          </a:p>
+        </p:txBody>
+      </p:sp>
+    </p:spTree>
+    <p:extLst>
+      <p:ext uri="{BB962C8B-B14F-4D97-AF65-F5344CB8AC3E}">
+        <p14:creationId xmlns:p14="http://schemas.microsoft.com/office/powerpoint/2010/main" val="4067505277"/>
+      </p:ext>
+    </p:extLst>
+  </p:cSld>
+  <p:clrMapOvr>
+    <a:masterClrMapping/>
+  </p:clrMapOvr>
+</p:notes>
+</file>
+
+<file path=ppt/notesSlides/notesSlide5.xml><?xml version="1.0" encoding="utf-8"?>
+<p:notes xmlns:a="http://schemas.openxmlformats.org/drawingml/2006/main" xmlns:r="http://schemas.openxmlformats.org/officeDocument/2006/relationships" xmlns:p="http://schemas.openxmlformats.org/presentationml/2006/main">
+  <p:cSld>
+    <p:spTree>
+      <p:nvGrpSpPr>
+        <p:cNvPr id="1" name=""/>
+        <p:cNvGrpSpPr/>
+        <p:nvPr/>
+      </p:nvGrpSpPr>
+      <p:grpSpPr>
+        <a:xfrm>
+          <a:off x="0" y="0"/>
+          <a:ext cx="0" cy="0"/>
+          <a:chOff x="0" y="0"/>
+          <a:chExt cx="0" cy="0"/>
+        </a:xfrm>
+      </p:grpSpPr>
+      <p:sp>
+        <p:nvSpPr>
+          <p:cNvPr id="2" name="Slide Image Placeholder 1"/>
+          <p:cNvSpPr>
+            <a:spLocks noGrp="1" noRot="1" noChangeAspect="1"/>
+          </p:cNvSpPr>
+          <p:nvPr>
+            <p:ph type="sldImg"/>
+          </p:nvPr>
+        </p:nvSpPr>
+        <p:spPr/>
+      </p:sp>
+      <p:sp>
+        <p:nvSpPr>
+          <p:cNvPr id="3" name="Notes Placeholder 2"/>
+          <p:cNvSpPr>
+            <a:spLocks noGrp="1"/>
+          </p:cNvSpPr>
+          <p:nvPr>
+            <p:ph type="body" idx="1"/>
+          </p:nvPr>
+        </p:nvSpPr>
+        <p:spPr/>
+        <p:txBody>
+          <a:bodyPr/>
+          <a:lstStyle/>
+          <a:p>
+            <a:endParaRPr lang="en-US" dirty="0"/>
+          </a:p>
+        </p:txBody>
+      </p:sp>
+      <p:sp>
+        <p:nvSpPr>
+          <p:cNvPr id="4" name="Slide Number Placeholder 3"/>
+          <p:cNvSpPr>
+            <a:spLocks noGrp="1"/>
+          </p:cNvSpPr>
+          <p:nvPr>
+            <p:ph type="sldNum" sz="quarter" idx="10"/>
+          </p:nvPr>
+        </p:nvSpPr>
+        <p:spPr/>
+        <p:txBody>
+          <a:bodyPr/>
+          <a:lstStyle/>
+          <a:p>
+            <a:fld id="{07C1FDB8-61B4-482D-AF5F-A56619606BBA}" type="slidenum">
+              <a:rPr lang="en-US" smtClean="0"/>
+              <a:t>7</a:t>
+            </a:fld>
+            <a:endParaRPr lang="en-US"/>
+          </a:p>
+        </p:txBody>
+      </p:sp>
+    </p:spTree>
+    <p:extLst>
+      <p:ext uri="{BB962C8B-B14F-4D97-AF65-F5344CB8AC3E}">
+        <p14:creationId xmlns:p14="http://schemas.microsoft.com/office/powerpoint/2010/main" val="3892052514"/>
+      </p:ext>
+    </p:extLst>
+  </p:cSld>
+  <p:clrMapOvr>
+    <a:masterClrMapping/>
+  </p:clrMapOvr>
+</p:notes>
+</file>
+
+<file path=ppt/notesSlides/notesSlide6.xml><?xml version="1.0" encoding="utf-8"?>
+<p:notes xmlns:a="http://schemas.openxmlformats.org/drawingml/2006/main" xmlns:r="http://schemas.openxmlformats.org/officeDocument/2006/relationships" xmlns:p="http://schemas.openxmlformats.org/presentationml/2006/main">
+  <p:cSld>
+    <p:spTree>
+      <p:nvGrpSpPr>
+        <p:cNvPr id="1" name=""/>
+        <p:cNvGrpSpPr/>
+        <p:nvPr/>
+      </p:nvGrpSpPr>
+      <p:grpSpPr>
+        <a:xfrm>
+          <a:off x="0" y="0"/>
+          <a:ext cx="0" cy="0"/>
+          <a:chOff x="0" y="0"/>
+          <a:chExt cx="0" cy="0"/>
+        </a:xfrm>
+      </p:grpSpPr>
+      <p:sp>
+        <p:nvSpPr>
+          <p:cNvPr id="2" name="Slide Image Placeholder 1"/>
+          <p:cNvSpPr>
+            <a:spLocks noGrp="1" noRot="1" noChangeAspect="1"/>
+          </p:cNvSpPr>
+          <p:nvPr>
+            <p:ph type="sldImg"/>
+          </p:nvPr>
+        </p:nvSpPr>
+        <p:spPr/>
+      </p:sp>
+      <p:sp>
+        <p:nvSpPr>
+          <p:cNvPr id="3" name="Notes Placeholder 2"/>
+          <p:cNvSpPr>
+            <a:spLocks noGrp="1"/>
+          </p:cNvSpPr>
+          <p:nvPr>
+            <p:ph type="body" idx="1"/>
+          </p:nvPr>
+        </p:nvSpPr>
+        <p:spPr/>
+        <p:txBody>
+          <a:bodyPr/>
+          <a:lstStyle/>
+          <a:p>
+            <a:r>
+              <a:rPr lang="en-US" dirty="0" smtClean="0"/>
+              <a:t>Different than a commercial</a:t>
+            </a:r>
+            <a:r>
+              <a:rPr lang="en-US" baseline="0" dirty="0" smtClean="0"/>
+              <a:t> mobile carrier which has to consider backwards compatibility with 2G and 3G devices</a:t>
+            </a:r>
+          </a:p>
+          <a:p>
+            <a:endParaRPr lang="en-US" baseline="0" dirty="0" smtClean="0"/>
+          </a:p>
+          <a:p>
+            <a:r>
+              <a:rPr lang="en-US" baseline="0" dirty="0" smtClean="0"/>
+              <a:t>Demo – cell phone</a:t>
+            </a:r>
+            <a:endParaRPr lang="en-US" dirty="0"/>
+          </a:p>
+        </p:txBody>
+      </p:sp>
+      <p:sp>
+        <p:nvSpPr>
+          <p:cNvPr id="4" name="Slide Number Placeholder 3"/>
+          <p:cNvSpPr>
+            <a:spLocks noGrp="1"/>
+          </p:cNvSpPr>
+          <p:nvPr>
+            <p:ph type="sldNum" sz="quarter" idx="10"/>
+          </p:nvPr>
+        </p:nvSpPr>
+        <p:spPr/>
+        <p:txBody>
+          <a:bodyPr/>
+          <a:lstStyle/>
+          <a:p>
+            <a:fld id="{07C1FDB8-61B4-482D-AF5F-A56619606BBA}" type="slidenum">
+              <a:rPr lang="en-US" smtClean="0"/>
+              <a:t>8</a:t>
+            </a:fld>
+            <a:endParaRPr lang="en-US"/>
+          </a:p>
+        </p:txBody>
+      </p:sp>
+    </p:spTree>
+    <p:extLst>
+      <p:ext uri="{BB962C8B-B14F-4D97-AF65-F5344CB8AC3E}">
+        <p14:creationId xmlns:p14="http://schemas.microsoft.com/office/powerpoint/2010/main" val="2483209332"/>
+      </p:ext>
+    </p:extLst>
+  </p:cSld>
+  <p:clrMapOvr>
+    <a:masterClrMapping/>
+  </p:clrMapOvr>
+</p:notes>
+</file>
+
 <file path=ppt/slideLayouts/slideLayout1.xml><?xml version="1.0" encoding="utf-8"?>
 <p:sldLayout xmlns:a="http://schemas.openxmlformats.org/drawingml/2006/main" xmlns:r="http://schemas.openxmlformats.org/officeDocument/2006/relationships" xmlns:p="http://schemas.openxmlformats.org/presentationml/2006/main" type="title" preserve="1">
   <p:cSld name="Title Slide">
@@ -884,7 +1378,7 @@
           <a:p>
             <a:fld id="{9D982923-76D2-455A-94FD-9E8ADFC1AFE8}" type="datetimeFigureOut">
               <a:rPr lang="en-US" smtClean="0"/>
-              <a:t>5/1/2017</a:t>
+              <a:t>5/2/2017</a:t>
             </a:fld>
             <a:endParaRPr lang="en-US"/>
           </a:p>
@@ -1159,7 +1653,7 @@
           <a:p>
             <a:fld id="{9D982923-76D2-455A-94FD-9E8ADFC1AFE8}" type="datetimeFigureOut">
               <a:rPr lang="en-US" smtClean="0"/>
-              <a:t>5/1/2017</a:t>
+              <a:t>5/2/2017</a:t>
             </a:fld>
             <a:endParaRPr lang="en-US"/>
           </a:p>
@@ -1353,7 +1847,7 @@
           <a:p>
             <a:fld id="{9D982923-76D2-455A-94FD-9E8ADFC1AFE8}" type="datetimeFigureOut">
               <a:rPr lang="en-US" smtClean="0"/>
-              <a:t>5/1/2017</a:t>
+              <a:t>5/2/2017</a:t>
             </a:fld>
             <a:endParaRPr lang="en-US"/>
           </a:p>
@@ -1626,7 +2120,7 @@
           <a:p>
             <a:fld id="{9D982923-76D2-455A-94FD-9E8ADFC1AFE8}" type="datetimeFigureOut">
               <a:rPr lang="en-US" smtClean="0"/>
-              <a:t>5/1/2017</a:t>
+              <a:t>5/2/2017</a:t>
             </a:fld>
             <a:endParaRPr lang="en-US"/>
           </a:p>
@@ -1967,7 +2461,7 @@
           <a:p>
             <a:fld id="{9D982923-76D2-455A-94FD-9E8ADFC1AFE8}" type="datetimeFigureOut">
               <a:rPr lang="en-US" smtClean="0"/>
-              <a:t>5/1/2017</a:t>
+              <a:t>5/2/2017</a:t>
             </a:fld>
             <a:endParaRPr lang="en-US"/>
           </a:p>
@@ -2590,7 +3084,7 @@
           <a:p>
             <a:fld id="{9D982923-76D2-455A-94FD-9E8ADFC1AFE8}" type="datetimeFigureOut">
               <a:rPr lang="en-US" smtClean="0"/>
-              <a:t>5/1/2017</a:t>
+              <a:t>5/2/2017</a:t>
             </a:fld>
             <a:endParaRPr lang="en-US"/>
           </a:p>
@@ -3450,7 +3944,7 @@
           <a:p>
             <a:fld id="{9D982923-76D2-455A-94FD-9E8ADFC1AFE8}" type="datetimeFigureOut">
               <a:rPr lang="en-US" smtClean="0"/>
-              <a:t>5/1/2017</a:t>
+              <a:t>5/2/2017</a:t>
             </a:fld>
             <a:endParaRPr lang="en-US"/>
           </a:p>
@@ -3620,7 +4114,7 @@
           <a:p>
             <a:fld id="{9D982923-76D2-455A-94FD-9E8ADFC1AFE8}" type="datetimeFigureOut">
               <a:rPr lang="en-US" smtClean="0"/>
-              <a:t>5/1/2017</a:t>
+              <a:t>5/2/2017</a:t>
             </a:fld>
             <a:endParaRPr lang="en-US"/>
           </a:p>
@@ -3800,7 +4294,7 @@
           <a:p>
             <a:fld id="{9D982923-76D2-455A-94FD-9E8ADFC1AFE8}" type="datetimeFigureOut">
               <a:rPr lang="en-US" smtClean="0"/>
-              <a:t>5/1/2017</a:t>
+              <a:t>5/2/2017</a:t>
             </a:fld>
             <a:endParaRPr lang="en-US"/>
           </a:p>
@@ -3970,7 +4464,7 @@
           <a:p>
             <a:fld id="{9D982923-76D2-455A-94FD-9E8ADFC1AFE8}" type="datetimeFigureOut">
               <a:rPr lang="en-US" smtClean="0"/>
-              <a:t>5/1/2017</a:t>
+              <a:t>5/2/2017</a:t>
             </a:fld>
             <a:endParaRPr lang="en-US"/>
           </a:p>
@@ -4217,7 +4711,7 @@
           <a:p>
             <a:fld id="{9D982923-76D2-455A-94FD-9E8ADFC1AFE8}" type="datetimeFigureOut">
               <a:rPr lang="en-US" smtClean="0"/>
-              <a:t>5/1/2017</a:t>
+              <a:t>5/2/2017</a:t>
             </a:fld>
             <a:endParaRPr lang="en-US"/>
           </a:p>
@@ -4509,7 +5003,7 @@
           <a:p>
             <a:fld id="{9D982923-76D2-455A-94FD-9E8ADFC1AFE8}" type="datetimeFigureOut">
               <a:rPr lang="en-US" smtClean="0"/>
-              <a:t>5/1/2017</a:t>
+              <a:t>5/2/2017</a:t>
             </a:fld>
             <a:endParaRPr lang="en-US"/>
           </a:p>
@@ -4953,7 +5447,7 @@
           <a:p>
             <a:fld id="{9D982923-76D2-455A-94FD-9E8ADFC1AFE8}" type="datetimeFigureOut">
               <a:rPr lang="en-US" smtClean="0"/>
-              <a:t>5/1/2017</a:t>
+              <a:t>5/2/2017</a:t>
             </a:fld>
             <a:endParaRPr lang="en-US"/>
           </a:p>
@@ -5071,7 +5565,7 @@
           <a:p>
             <a:fld id="{9D982923-76D2-455A-94FD-9E8ADFC1AFE8}" type="datetimeFigureOut">
               <a:rPr lang="en-US" smtClean="0"/>
-              <a:t>5/1/2017</a:t>
+              <a:t>5/2/2017</a:t>
             </a:fld>
             <a:endParaRPr lang="en-US"/>
           </a:p>
@@ -5166,7 +5660,7 @@
           <a:p>
             <a:fld id="{9D982923-76D2-455A-94FD-9E8ADFC1AFE8}" type="datetimeFigureOut">
               <a:rPr lang="en-US" smtClean="0"/>
-              <a:t>5/1/2017</a:t>
+              <a:t>5/2/2017</a:t>
             </a:fld>
             <a:endParaRPr lang="en-US"/>
           </a:p>
@@ -5445,7 +5939,7 @@
           <a:p>
             <a:fld id="{9D982923-76D2-455A-94FD-9E8ADFC1AFE8}" type="datetimeFigureOut">
               <a:rPr lang="en-US" smtClean="0"/>
-              <a:t>5/1/2017</a:t>
+              <a:t>5/2/2017</a:t>
             </a:fld>
             <a:endParaRPr lang="en-US"/>
           </a:p>
@@ -5720,7 +6214,7 @@
           <a:p>
             <a:fld id="{9D982923-76D2-455A-94FD-9E8ADFC1AFE8}" type="datetimeFigureOut">
               <a:rPr lang="en-US" smtClean="0"/>
-              <a:t>5/1/2017</a:t>
+              <a:t>5/2/2017</a:t>
             </a:fld>
             <a:endParaRPr lang="en-US"/>
           </a:p>
@@ -6149,7 +6643,7 @@
           <a:p>
             <a:fld id="{9D982923-76D2-455A-94FD-9E8ADFC1AFE8}" type="datetimeFigureOut">
               <a:rPr lang="en-US" smtClean="0"/>
-              <a:t>5/1/2017</a:t>
+              <a:t>5/2/2017</a:t>
             </a:fld>
             <a:endParaRPr lang="en-US"/>
           </a:p>
@@ -7381,6 +7875,53 @@
       </p:grpSpPr>
       <p:sp>
         <p:nvSpPr>
+          <p:cNvPr id="5" name="Rounded Rectangle 4"/>
+          <p:cNvSpPr/>
+          <p:nvPr/>
+        </p:nvSpPr>
+        <p:spPr>
+          <a:xfrm>
+            <a:off x="1347538" y="1337911"/>
+            <a:ext cx="3927107" cy="5154329"/>
+          </a:xfrm>
+          <a:prstGeom prst="roundRect">
+            <a:avLst/>
+          </a:prstGeom>
+          <a:noFill/>
+          <a:ln w="38100">
+            <a:solidFill>
+              <a:srgbClr val="FF0000"/>
+            </a:solidFill>
+            <a:prstDash val="dashDot"/>
+          </a:ln>
+        </p:spPr>
+        <p:style>
+          <a:lnRef idx="2">
+            <a:schemeClr val="accent1">
+              <a:shade val="50000"/>
+            </a:schemeClr>
+          </a:lnRef>
+          <a:fillRef idx="1">
+            <a:schemeClr val="accent1"/>
+          </a:fillRef>
+          <a:effectRef idx="0">
+            <a:schemeClr val="accent1"/>
+          </a:effectRef>
+          <a:fontRef idx="minor">
+            <a:schemeClr val="lt1"/>
+          </a:fontRef>
+        </p:style>
+        <p:txBody>
+          <a:bodyPr rtlCol="0" anchor="ctr"/>
+          <a:lstStyle/>
+          <a:p>
+            <a:pPr algn="ctr"/>
+            <a:endParaRPr lang="en-US"/>
+          </a:p>
+        </p:txBody>
+      </p:sp>
+      <p:sp>
+        <p:nvSpPr>
           <p:cNvPr id="2" name="Title 1"/>
           <p:cNvSpPr>
             <a:spLocks noGrp="1"/>
@@ -7399,25 +7940,6 @@
               <a:t>Proposed Solution - Overview</a:t>
             </a:r>
             <a:endParaRPr lang="en-US" dirty="0"/>
-          </a:p>
-        </p:txBody>
-      </p:sp>
-      <p:sp>
-        <p:nvSpPr>
-          <p:cNvPr id="3" name="Content Placeholder 2"/>
-          <p:cNvSpPr>
-            <a:spLocks noGrp="1"/>
-          </p:cNvSpPr>
-          <p:nvPr>
-            <p:ph idx="1"/>
-          </p:nvPr>
-        </p:nvSpPr>
-        <p:spPr/>
-        <p:txBody>
-          <a:bodyPr/>
-          <a:lstStyle/>
-          <a:p>
-            <a:endParaRPr lang="en-US"/>
           </a:p>
         </p:txBody>
       </p:sp>
@@ -7428,7 +7950,7 @@
           <p:nvPr/>
         </p:nvPicPr>
         <p:blipFill>
-          <a:blip r:embed="rId2">
+          <a:blip r:embed="rId3">
             <a:extLst>
               <a:ext uri="{28A0092B-C50C-407E-A947-70E740481C1C}">
                 <a14:useLocalDpi xmlns:a14="http://schemas.microsoft.com/office/drawing/2010/main" val="0"/>
@@ -7529,7 +8051,67 @@
           <a:bodyPr/>
           <a:lstStyle/>
           <a:p>
-            <a:endParaRPr lang="en-US"/>
+            <a:r>
+              <a:rPr lang="en-US" dirty="0" smtClean="0"/>
+              <a:t>Threats</a:t>
+            </a:r>
+          </a:p>
+          <a:p>
+            <a:pPr lvl="1"/>
+            <a:r>
+              <a:rPr lang="en-US" dirty="0" smtClean="0"/>
+              <a:t>Insider attacks</a:t>
+            </a:r>
+          </a:p>
+          <a:p>
+            <a:pPr lvl="1"/>
+            <a:r>
+              <a:rPr lang="en-US" dirty="0" smtClean="0"/>
+              <a:t>External attacks from other networks (Internet)</a:t>
+            </a:r>
+          </a:p>
+          <a:p>
+            <a:pPr lvl="1"/>
+            <a:r>
+              <a:rPr lang="en-US" dirty="0" smtClean="0"/>
+              <a:t>External attacks on physical access to the network on radio interfaces</a:t>
+            </a:r>
+          </a:p>
+          <a:p>
+            <a:pPr lvl="1"/>
+            <a:r>
+              <a:rPr lang="en-US" dirty="0" smtClean="0"/>
+              <a:t>Attacks from other devices</a:t>
+            </a:r>
+          </a:p>
+          <a:p>
+            <a:r>
+              <a:rPr lang="en-US" dirty="0" smtClean="0"/>
+              <a:t>IPsec (IP Security)</a:t>
+            </a:r>
+          </a:p>
+          <a:p>
+            <a:pPr lvl="1"/>
+            <a:r>
+              <a:rPr lang="en-US" dirty="0" smtClean="0"/>
+              <a:t>Open standards framework to help ensure private, secure communications over IP protocol through cryptographic services</a:t>
+            </a:r>
+            <a:endParaRPr lang="en-US" dirty="0" smtClean="0"/>
+          </a:p>
+          <a:p>
+            <a:pPr lvl="1"/>
+            <a:r>
+              <a:rPr lang="en-US" dirty="0" smtClean="0"/>
+              <a:t>Authentication and encryption between towers and core network</a:t>
+            </a:r>
+          </a:p>
+          <a:p>
+            <a:pPr lvl="1"/>
+            <a:r>
+              <a:rPr lang="en-US" dirty="0" smtClean="0"/>
+              <a:t>Protect integrity of user traffic and network</a:t>
+            </a:r>
+            <a:endParaRPr lang="en-US" dirty="0"/>
           </a:p>
         </p:txBody>
       </p:sp>
@@ -7543,6 +8125,13 @@
   <p:clrMapOvr>
     <a:masterClrMapping/>
   </p:clrMapOvr>
+  <p:timing>
+    <p:tnLst>
+      <p:par>
+        <p:cTn id="1" dur="indefinite" restart="never" nodeType="tmRoot"/>
+      </p:par>
+    </p:tnLst>
+  </p:timing>
 </p:sld>
 </file>
 
@@ -7601,7 +8190,73 @@
           <a:bodyPr/>
           <a:lstStyle/>
           <a:p>
-            <a:endParaRPr lang="en-US"/>
+            <a:r>
+              <a:rPr lang="en-US" dirty="0" smtClean="0"/>
+              <a:t>Device to Network</a:t>
+            </a:r>
+          </a:p>
+          <a:p>
+            <a:pPr lvl="1"/>
+            <a:r>
+              <a:rPr lang="en-US" dirty="0" smtClean="0"/>
+              <a:t>UICC – SIM Card</a:t>
+            </a:r>
+          </a:p>
+          <a:p>
+            <a:pPr lvl="2"/>
+            <a:r>
+              <a:rPr lang="en-US" dirty="0" smtClean="0"/>
+              <a:t>Hardware storage location for sensitive information such as a pre-shared key and IMSI</a:t>
+            </a:r>
+          </a:p>
+          <a:p>
+            <a:pPr lvl="3"/>
+            <a:r>
+              <a:rPr lang="en-US" dirty="0" smtClean="0"/>
+              <a:t>IMSI is unique to every subscriber (device)</a:t>
+            </a:r>
+          </a:p>
+          <a:p>
+            <a:pPr lvl="2"/>
+            <a:r>
+              <a:rPr lang="en-US" dirty="0" smtClean="0"/>
+              <a:t>FirstNet will not grant access to anything other than a LTE SIM card</a:t>
+            </a:r>
+          </a:p>
+          <a:p>
+            <a:r>
+              <a:rPr lang="en-US" dirty="0" smtClean="0"/>
+              <a:t>User of Device</a:t>
+            </a:r>
+          </a:p>
+          <a:p>
+            <a:pPr lvl="1"/>
+            <a:r>
+              <a:rPr lang="en-US" dirty="0" smtClean="0"/>
+              <a:t>2 layers of authentication to access mission critical data</a:t>
+            </a:r>
+          </a:p>
+          <a:p>
+            <a:pPr lvl="2"/>
+            <a:r>
+              <a:rPr lang="en-US" dirty="0" smtClean="0"/>
+              <a:t>First layer to access basic features of device</a:t>
+            </a:r>
+          </a:p>
+          <a:p>
+            <a:pPr lvl="2"/>
+            <a:r>
+              <a:rPr lang="en-US" dirty="0" smtClean="0"/>
+              <a:t>Second layer to access mission critical data with VPN support</a:t>
+            </a:r>
+          </a:p>
+          <a:p>
+            <a:pPr lvl="2"/>
+            <a:r>
+              <a:rPr lang="en-US" dirty="0" smtClean="0"/>
+              <a:t>Example: Samsung KNOX</a:t>
+            </a:r>
+            <a:endParaRPr lang="en-US" dirty="0"/>
           </a:p>
         </p:txBody>
       </p:sp>
@@ -7615,6 +8270,13 @@
   <p:clrMapOvr>
     <a:masterClrMapping/>
   </p:clrMapOvr>
+  <p:timing>
+    <p:tnLst>
+      <p:par>
+        <p:cTn id="1" dur="indefinite" restart="never" nodeType="tmRoot"/>
+      </p:par>
+    </p:tnLst>
+  </p:timing>
 </p:sld>
 </file>
 
@@ -7673,7 +8335,29 @@
           <a:bodyPr/>
           <a:lstStyle/>
           <a:p>
-            <a:endParaRPr lang="en-US"/>
+            <a:r>
+              <a:rPr lang="en-US" dirty="0" smtClean="0"/>
+              <a:t>Approved applications</a:t>
+            </a:r>
+          </a:p>
+          <a:p>
+            <a:pPr lvl="1"/>
+            <a:r>
+              <a:rPr lang="en-US" dirty="0" smtClean="0"/>
+              <a:t>Sensitive applications require additional application specific login credentials</a:t>
+            </a:r>
+          </a:p>
+          <a:p>
+            <a:r>
+              <a:rPr lang="en-US" dirty="0" smtClean="0"/>
+              <a:t>HTTPS</a:t>
+            </a:r>
+          </a:p>
+          <a:p>
+            <a:endParaRPr lang="en-US" dirty="0" smtClean="0"/>
+          </a:p>
+          <a:p>
+            <a:endParaRPr lang="en-US" dirty="0"/>
           </a:p>
         </p:txBody>
       </p:sp>
@@ -7687,6 +8371,13 @@
   <p:clrMapOvr>
     <a:masterClrMapping/>
   </p:clrMapOvr>
+  <p:timing>
+    <p:tnLst>
+      <p:par>
+        <p:cTn id="1" dur="indefinite" restart="never" nodeType="tmRoot"/>
+      </p:par>
+    </p:tnLst>
+  </p:timing>
 </p:sld>
 </file>
 

</xml_diff>

<commit_message>
Last update at home.
</commit_message>
<xml_diff>
--- a/Project/KevinKuo - Project Presentation.pptx
+++ b/Project/KevinKuo - Project Presentation.pptx
@@ -5,7 +5,7 @@
     <p:sldMasterId id="2147483660" r:id="rId1"/>
   </p:sldMasterIdLst>
   <p:notesMasterIdLst>
-    <p:notesMasterId r:id="rId13"/>
+    <p:notesMasterId r:id="rId15"/>
   </p:notesMasterIdLst>
   <p:sldIdLst>
     <p:sldId id="256" r:id="rId2"/>
@@ -19,6 +19,8 @@
     <p:sldId id="265" r:id="rId10"/>
     <p:sldId id="266" r:id="rId11"/>
     <p:sldId id="267" r:id="rId12"/>
+    <p:sldId id="268" r:id="rId13"/>
+    <p:sldId id="269" r:id="rId14"/>
   </p:sldIdLst>
   <p:sldSz cx="12192000" cy="6858000"/>
   <p:notesSz cx="6858000" cy="9144000"/>
@@ -207,7 +209,7 @@
           <a:p>
             <a:fld id="{ED4CCED0-97CC-4CC6-95AA-BC631DD8E4EF}" type="datetimeFigureOut">
               <a:rPr lang="en-US" smtClean="0"/>
-              <a:t>5/2/2017</a:t>
+              <a:t>5/4/2017</a:t>
             </a:fld>
             <a:endParaRPr lang="en-US"/>
           </a:p>
@@ -551,19 +553,7 @@
                 <a:ea typeface="+mn-ea"/>
                 <a:cs typeface="+mn-cs"/>
               </a:rPr>
-              <a:t>Middle Class Tax Relief and Job Creation Act (MCTRJC) of 2012 required FirstNet, a government managed next generation public safety communication network initiative known as the First Responder Network Authority, to build, operate, and maintain the first high speed nationwide broadband network dedicated to public safety</a:t>
-            </a:r>
-            <a:r>
-              <a:rPr lang="en-US" sz="1200" kern="1200" dirty="0" smtClean="0">
-                <a:solidFill>
-                  <a:schemeClr val="tx1"/>
-                </a:solidFill>
-                <a:effectLst/>
-                <a:latin typeface="+mn-lt"/>
-                <a:ea typeface="+mn-ea"/>
-                <a:cs typeface="+mn-cs"/>
-              </a:rPr>
-              <a:t>.</a:t>
+              <a:t>Middle Class Tax Relief and Job Creation Act (MCTRJC) of 2012 required FirstNet, a government managed next generation public safety communication network initiative known as the First Responder Network Authority, to build, operate, and maintain the first high speed nationwide broadband network dedicated to public safety.</a:t>
             </a:r>
             <a:br>
               <a:rPr lang="en-US" sz="1200" kern="1200" dirty="0" smtClean="0">
@@ -1192,6 +1182,103 @@
 </p:notes>
 </file>
 
+<file path=ppt/notesSlides/notesSlide7.xml><?xml version="1.0" encoding="utf-8"?>
+<p:notes xmlns:a="http://schemas.openxmlformats.org/drawingml/2006/main" xmlns:r="http://schemas.openxmlformats.org/officeDocument/2006/relationships" xmlns:p="http://schemas.openxmlformats.org/presentationml/2006/main">
+  <p:cSld>
+    <p:spTree>
+      <p:nvGrpSpPr>
+        <p:cNvPr id="1" name=""/>
+        <p:cNvGrpSpPr/>
+        <p:nvPr/>
+      </p:nvGrpSpPr>
+      <p:grpSpPr>
+        <a:xfrm>
+          <a:off x="0" y="0"/>
+          <a:ext cx="0" cy="0"/>
+          <a:chOff x="0" y="0"/>
+          <a:chExt cx="0" cy="0"/>
+        </a:xfrm>
+      </p:grpSpPr>
+      <p:sp>
+        <p:nvSpPr>
+          <p:cNvPr id="2" name="Slide Image Placeholder 1"/>
+          <p:cNvSpPr>
+            <a:spLocks noGrp="1" noRot="1" noChangeAspect="1"/>
+          </p:cNvSpPr>
+          <p:nvPr>
+            <p:ph type="sldImg"/>
+          </p:nvPr>
+        </p:nvSpPr>
+        <p:spPr/>
+      </p:sp>
+      <p:sp>
+        <p:nvSpPr>
+          <p:cNvPr id="3" name="Notes Placeholder 2"/>
+          <p:cNvSpPr>
+            <a:spLocks noGrp="1"/>
+          </p:cNvSpPr>
+          <p:nvPr>
+            <p:ph type="body" idx="1"/>
+          </p:nvPr>
+        </p:nvSpPr>
+        <p:spPr/>
+        <p:txBody>
+          <a:bodyPr/>
+          <a:lstStyle/>
+          <a:p>
+            <a:r>
+              <a:rPr lang="en-US" dirty="0" smtClean="0"/>
+              <a:t>Hyper Text Transfer Protocol Secure (HTTPS) is the secure version of HTTP, the protocol over which data is sent between your browser and the website that you are connected to. The 'S' at the end of HTTPS stands for 'Secure'. It means all communications between your browser and the website are encrypted. HTTPS is often used to protect highly confidential online transactions like online banking and online shopping order forms.</a:t>
+            </a:r>
+          </a:p>
+          <a:p>
+            <a:endParaRPr lang="en-US" dirty="0" smtClean="0"/>
+          </a:p>
+          <a:p>
+            <a:r>
+              <a:rPr lang="en-US" i="1" dirty="0" smtClean="0"/>
+              <a:t>TLS (Transport Layer Security) and SSL (Secure Sockets Layer) are protocols that provide data encryption and authentication between applications and servers in scenarios where that data is being sent across an insecure network, such as checking your email (How does the Secure Socket Layer work?). The terms SSL and TLS are often used interchangeably or in conjunction with each other (TLS/SSL), but one is in fact the predecessor of the other — SSL 3.0 served as the basis for TLS 1.0 which, as a result, is sometimes referred to as SSL 3.1. With this said though, is there actually a practical difference between the two?</a:t>
+            </a:r>
+            <a:endParaRPr lang="en-US" i="1" dirty="0"/>
+          </a:p>
+        </p:txBody>
+      </p:sp>
+      <p:sp>
+        <p:nvSpPr>
+          <p:cNvPr id="4" name="Slide Number Placeholder 3"/>
+          <p:cNvSpPr>
+            <a:spLocks noGrp="1"/>
+          </p:cNvSpPr>
+          <p:nvPr>
+            <p:ph type="sldNum" sz="quarter" idx="10"/>
+          </p:nvPr>
+        </p:nvSpPr>
+        <p:spPr/>
+        <p:txBody>
+          <a:bodyPr/>
+          <a:lstStyle/>
+          <a:p>
+            <a:fld id="{07C1FDB8-61B4-482D-AF5F-A56619606BBA}" type="slidenum">
+              <a:rPr lang="en-US" smtClean="0"/>
+              <a:t>9</a:t>
+            </a:fld>
+            <a:endParaRPr lang="en-US"/>
+          </a:p>
+        </p:txBody>
+      </p:sp>
+    </p:spTree>
+    <p:extLst>
+      <p:ext uri="{BB962C8B-B14F-4D97-AF65-F5344CB8AC3E}">
+        <p14:creationId xmlns:p14="http://schemas.microsoft.com/office/powerpoint/2010/main" val="2304598400"/>
+      </p:ext>
+    </p:extLst>
+  </p:cSld>
+  <p:clrMapOvr>
+    <a:masterClrMapping/>
+  </p:clrMapOvr>
+</p:notes>
+</file>
+
 <file path=ppt/slideLayouts/slideLayout1.xml><?xml version="1.0" encoding="utf-8"?>
 <p:sldLayout xmlns:a="http://schemas.openxmlformats.org/drawingml/2006/main" xmlns:r="http://schemas.openxmlformats.org/officeDocument/2006/relationships" xmlns:p="http://schemas.openxmlformats.org/presentationml/2006/main" type="title" preserve="1">
   <p:cSld name="Title Slide">
@@ -1378,7 +1465,7 @@
           <a:p>
             <a:fld id="{9D982923-76D2-455A-94FD-9E8ADFC1AFE8}" type="datetimeFigureOut">
               <a:rPr lang="en-US" smtClean="0"/>
-              <a:t>5/2/2017</a:t>
+              <a:t>5/4/2017</a:t>
             </a:fld>
             <a:endParaRPr lang="en-US"/>
           </a:p>
@@ -1653,7 +1740,7 @@
           <a:p>
             <a:fld id="{9D982923-76D2-455A-94FD-9E8ADFC1AFE8}" type="datetimeFigureOut">
               <a:rPr lang="en-US" smtClean="0"/>
-              <a:t>5/2/2017</a:t>
+              <a:t>5/4/2017</a:t>
             </a:fld>
             <a:endParaRPr lang="en-US"/>
           </a:p>
@@ -1847,7 +1934,7 @@
           <a:p>
             <a:fld id="{9D982923-76D2-455A-94FD-9E8ADFC1AFE8}" type="datetimeFigureOut">
               <a:rPr lang="en-US" smtClean="0"/>
-              <a:t>5/2/2017</a:t>
+              <a:t>5/4/2017</a:t>
             </a:fld>
             <a:endParaRPr lang="en-US"/>
           </a:p>
@@ -2120,7 +2207,7 @@
           <a:p>
             <a:fld id="{9D982923-76D2-455A-94FD-9E8ADFC1AFE8}" type="datetimeFigureOut">
               <a:rPr lang="en-US" smtClean="0"/>
-              <a:t>5/2/2017</a:t>
+              <a:t>5/4/2017</a:t>
             </a:fld>
             <a:endParaRPr lang="en-US"/>
           </a:p>
@@ -2461,7 +2548,7 @@
           <a:p>
             <a:fld id="{9D982923-76D2-455A-94FD-9E8ADFC1AFE8}" type="datetimeFigureOut">
               <a:rPr lang="en-US" smtClean="0"/>
-              <a:t>5/2/2017</a:t>
+              <a:t>5/4/2017</a:t>
             </a:fld>
             <a:endParaRPr lang="en-US"/>
           </a:p>
@@ -3084,7 +3171,7 @@
           <a:p>
             <a:fld id="{9D982923-76D2-455A-94FD-9E8ADFC1AFE8}" type="datetimeFigureOut">
               <a:rPr lang="en-US" smtClean="0"/>
-              <a:t>5/2/2017</a:t>
+              <a:t>5/4/2017</a:t>
             </a:fld>
             <a:endParaRPr lang="en-US"/>
           </a:p>
@@ -3944,7 +4031,7 @@
           <a:p>
             <a:fld id="{9D982923-76D2-455A-94FD-9E8ADFC1AFE8}" type="datetimeFigureOut">
               <a:rPr lang="en-US" smtClean="0"/>
-              <a:t>5/2/2017</a:t>
+              <a:t>5/4/2017</a:t>
             </a:fld>
             <a:endParaRPr lang="en-US"/>
           </a:p>
@@ -4114,7 +4201,7 @@
           <a:p>
             <a:fld id="{9D982923-76D2-455A-94FD-9E8ADFC1AFE8}" type="datetimeFigureOut">
               <a:rPr lang="en-US" smtClean="0"/>
-              <a:t>5/2/2017</a:t>
+              <a:t>5/4/2017</a:t>
             </a:fld>
             <a:endParaRPr lang="en-US"/>
           </a:p>
@@ -4294,7 +4381,7 @@
           <a:p>
             <a:fld id="{9D982923-76D2-455A-94FD-9E8ADFC1AFE8}" type="datetimeFigureOut">
               <a:rPr lang="en-US" smtClean="0"/>
-              <a:t>5/2/2017</a:t>
+              <a:t>5/4/2017</a:t>
             </a:fld>
             <a:endParaRPr lang="en-US"/>
           </a:p>
@@ -4464,7 +4551,7 @@
           <a:p>
             <a:fld id="{9D982923-76D2-455A-94FD-9E8ADFC1AFE8}" type="datetimeFigureOut">
               <a:rPr lang="en-US" smtClean="0"/>
-              <a:t>5/2/2017</a:t>
+              <a:t>5/4/2017</a:t>
             </a:fld>
             <a:endParaRPr lang="en-US"/>
           </a:p>
@@ -4711,7 +4798,7 @@
           <a:p>
             <a:fld id="{9D982923-76D2-455A-94FD-9E8ADFC1AFE8}" type="datetimeFigureOut">
               <a:rPr lang="en-US" smtClean="0"/>
-              <a:t>5/2/2017</a:t>
+              <a:t>5/4/2017</a:t>
             </a:fld>
             <a:endParaRPr lang="en-US"/>
           </a:p>
@@ -5003,7 +5090,7 @@
           <a:p>
             <a:fld id="{9D982923-76D2-455A-94FD-9E8ADFC1AFE8}" type="datetimeFigureOut">
               <a:rPr lang="en-US" smtClean="0"/>
-              <a:t>5/2/2017</a:t>
+              <a:t>5/4/2017</a:t>
             </a:fld>
             <a:endParaRPr lang="en-US"/>
           </a:p>
@@ -5447,7 +5534,7 @@
           <a:p>
             <a:fld id="{9D982923-76D2-455A-94FD-9E8ADFC1AFE8}" type="datetimeFigureOut">
               <a:rPr lang="en-US" smtClean="0"/>
-              <a:t>5/2/2017</a:t>
+              <a:t>5/4/2017</a:t>
             </a:fld>
             <a:endParaRPr lang="en-US"/>
           </a:p>
@@ -5565,7 +5652,7 @@
           <a:p>
             <a:fld id="{9D982923-76D2-455A-94FD-9E8ADFC1AFE8}" type="datetimeFigureOut">
               <a:rPr lang="en-US" smtClean="0"/>
-              <a:t>5/2/2017</a:t>
+              <a:t>5/4/2017</a:t>
             </a:fld>
             <a:endParaRPr lang="en-US"/>
           </a:p>
@@ -5660,7 +5747,7 @@
           <a:p>
             <a:fld id="{9D982923-76D2-455A-94FD-9E8ADFC1AFE8}" type="datetimeFigureOut">
               <a:rPr lang="en-US" smtClean="0"/>
-              <a:t>5/2/2017</a:t>
+              <a:t>5/4/2017</a:t>
             </a:fld>
             <a:endParaRPr lang="en-US"/>
           </a:p>
@@ -5939,7 +6026,7 @@
           <a:p>
             <a:fld id="{9D982923-76D2-455A-94FD-9E8ADFC1AFE8}" type="datetimeFigureOut">
               <a:rPr lang="en-US" smtClean="0"/>
-              <a:t>5/2/2017</a:t>
+              <a:t>5/4/2017</a:t>
             </a:fld>
             <a:endParaRPr lang="en-US"/>
           </a:p>
@@ -6214,7 +6301,7 @@
           <a:p>
             <a:fld id="{9D982923-76D2-455A-94FD-9E8ADFC1AFE8}" type="datetimeFigureOut">
               <a:rPr lang="en-US" smtClean="0"/>
-              <a:t>5/2/2017</a:t>
+              <a:t>5/4/2017</a:t>
             </a:fld>
             <a:endParaRPr lang="en-US"/>
           </a:p>
@@ -6643,7 +6730,7 @@
           <a:p>
             <a:fld id="{9D982923-76D2-455A-94FD-9E8ADFC1AFE8}" type="datetimeFigureOut">
               <a:rPr lang="en-US" smtClean="0"/>
-              <a:t>5/2/2017</a:t>
+              <a:t>5/4/2017</a:t>
             </a:fld>
             <a:endParaRPr lang="en-US"/>
           </a:p>
@@ -7298,6 +7385,29 @@
           <a:bodyPr/>
           <a:lstStyle/>
           <a:p>
+            <a:r>
+              <a:rPr lang="en-US" dirty="0" smtClean="0"/>
+              <a:t>Very secure for Unclassified For Official Use Only data</a:t>
+            </a:r>
+          </a:p>
+          <a:p>
+            <a:r>
+              <a:rPr lang="en-US" dirty="0" smtClean="0"/>
+              <a:t>Not 100% secure against State/Government actors</a:t>
+            </a:r>
+          </a:p>
+          <a:p>
+            <a:r>
+              <a:rPr lang="en-US" dirty="0" smtClean="0"/>
+              <a:t>Most challenging part is in implementation</a:t>
+            </a:r>
+          </a:p>
+          <a:p>
+            <a:pPr lvl="1"/>
+            <a:r>
+              <a:rPr lang="en-US" dirty="0" smtClean="0"/>
+              <a:t>Transitioning from commercial network to public safety network, FirstNet</a:t>
+            </a:r>
             <a:endParaRPr lang="en-US" dirty="0"/>
           </a:p>
         </p:txBody>
@@ -7371,6 +7481,232 @@
   <p:clrMapOvr>
     <a:masterClrMapping/>
   </p:clrMapOvr>
+</p:sld>
+</file>
+
+<file path=ppt/slides/slide12.xml><?xml version="1.0" encoding="utf-8"?>
+<p:sld xmlns:a="http://schemas.openxmlformats.org/drawingml/2006/main" xmlns:r="http://schemas.openxmlformats.org/officeDocument/2006/relationships" xmlns:p="http://schemas.openxmlformats.org/presentationml/2006/main">
+  <p:cSld>
+    <p:spTree>
+      <p:nvGrpSpPr>
+        <p:cNvPr id="1" name=""/>
+        <p:cNvGrpSpPr/>
+        <p:nvPr/>
+      </p:nvGrpSpPr>
+      <p:grpSpPr>
+        <a:xfrm>
+          <a:off x="0" y="0"/>
+          <a:ext cx="0" cy="0"/>
+          <a:chOff x="0" y="0"/>
+          <a:chExt cx="0" cy="0"/>
+        </a:xfrm>
+      </p:grpSpPr>
+      <p:sp>
+        <p:nvSpPr>
+          <p:cNvPr id="2" name="Title 1"/>
+          <p:cNvSpPr>
+            <a:spLocks noGrp="1"/>
+          </p:cNvSpPr>
+          <p:nvPr>
+            <p:ph type="ctrTitle"/>
+          </p:nvPr>
+        </p:nvSpPr>
+        <p:spPr/>
+        <p:txBody>
+          <a:bodyPr/>
+          <a:lstStyle/>
+          <a:p>
+            <a:r>
+              <a:rPr lang="en-US" dirty="0" smtClean="0"/>
+              <a:t>Survey - Wireless Network Security</a:t>
+            </a:r>
+            <a:endParaRPr lang="en-US" dirty="0"/>
+          </a:p>
+        </p:txBody>
+      </p:sp>
+      <p:sp>
+        <p:nvSpPr>
+          <p:cNvPr id="3" name="Subtitle 2"/>
+          <p:cNvSpPr>
+            <a:spLocks noGrp="1"/>
+          </p:cNvSpPr>
+          <p:nvPr>
+            <p:ph type="subTitle" idx="1"/>
+          </p:nvPr>
+        </p:nvSpPr>
+        <p:spPr>
+          <a:xfrm>
+            <a:off x="1154955" y="4777385"/>
+            <a:ext cx="8825659" cy="861420"/>
+          </a:xfrm>
+        </p:spPr>
+        <p:txBody>
+          <a:bodyPr>
+            <a:normAutofit/>
+          </a:bodyPr>
+          <a:lstStyle/>
+          <a:p>
+            <a:r>
+              <a:rPr lang="en-US" sz="2800" dirty="0"/>
+              <a:t>Kevin Kuo</a:t>
+            </a:r>
+          </a:p>
+        </p:txBody>
+      </p:sp>
+    </p:spTree>
+    <p:extLst>
+      <p:ext uri="{BB962C8B-B14F-4D97-AF65-F5344CB8AC3E}">
+        <p14:creationId xmlns:p14="http://schemas.microsoft.com/office/powerpoint/2010/main" val="3656645762"/>
+      </p:ext>
+    </p:extLst>
+  </p:cSld>
+  <p:clrMapOvr>
+    <a:masterClrMapping/>
+  </p:clrMapOvr>
+  <p:timing>
+    <p:tnLst>
+      <p:par>
+        <p:cTn id="1" dur="indefinite" restart="never" nodeType="tmRoot"/>
+      </p:par>
+    </p:tnLst>
+  </p:timing>
+</p:sld>
+</file>
+
+<file path=ppt/slides/slide13.xml><?xml version="1.0" encoding="utf-8"?>
+<p:sld xmlns:a="http://schemas.openxmlformats.org/drawingml/2006/main" xmlns:r="http://schemas.openxmlformats.org/officeDocument/2006/relationships" xmlns:p="http://schemas.openxmlformats.org/presentationml/2006/main">
+  <p:cSld>
+    <p:spTree>
+      <p:nvGrpSpPr>
+        <p:cNvPr id="1" name=""/>
+        <p:cNvGrpSpPr/>
+        <p:nvPr/>
+      </p:nvGrpSpPr>
+      <p:grpSpPr>
+        <a:xfrm>
+          <a:off x="0" y="0"/>
+          <a:ext cx="0" cy="0"/>
+          <a:chOff x="0" y="0"/>
+          <a:chExt cx="0" cy="0"/>
+        </a:xfrm>
+      </p:grpSpPr>
+      <p:sp>
+        <p:nvSpPr>
+          <p:cNvPr id="2" name="Title 1"/>
+          <p:cNvSpPr>
+            <a:spLocks noGrp="1"/>
+          </p:cNvSpPr>
+          <p:nvPr>
+            <p:ph type="title"/>
+          </p:nvPr>
+        </p:nvSpPr>
+        <p:spPr/>
+        <p:txBody>
+          <a:bodyPr/>
+          <a:lstStyle/>
+          <a:p>
+            <a:r>
+              <a:rPr lang="en-US" dirty="0" smtClean="0"/>
+              <a:t>Overview</a:t>
+            </a:r>
+            <a:endParaRPr lang="en-US" dirty="0"/>
+          </a:p>
+        </p:txBody>
+      </p:sp>
+      <p:sp>
+        <p:nvSpPr>
+          <p:cNvPr id="3" name="Content Placeholder 2"/>
+          <p:cNvSpPr>
+            <a:spLocks noGrp="1"/>
+          </p:cNvSpPr>
+          <p:nvPr>
+            <p:ph idx="1"/>
+          </p:nvPr>
+        </p:nvSpPr>
+        <p:spPr/>
+        <p:txBody>
+          <a:bodyPr>
+            <a:normAutofit/>
+          </a:bodyPr>
+          <a:lstStyle/>
+          <a:p>
+            <a:r>
+              <a:rPr lang="en-US" sz="2400" dirty="0" smtClean="0"/>
+              <a:t>Open </a:t>
+            </a:r>
+            <a:r>
+              <a:rPr lang="en-US" sz="2400" dirty="0" err="1" smtClean="0"/>
+              <a:t>WiFi</a:t>
+            </a:r>
+            <a:endParaRPr lang="en-US" sz="2400" dirty="0" smtClean="0"/>
+          </a:p>
+          <a:p>
+            <a:r>
+              <a:rPr lang="en-US" sz="2400" dirty="0" smtClean="0"/>
+              <a:t>WEP</a:t>
+            </a:r>
+          </a:p>
+          <a:p>
+            <a:pPr lvl="1"/>
+            <a:r>
+              <a:rPr lang="en-US" sz="2200" dirty="0" smtClean="0"/>
+              <a:t>Cracking WEP</a:t>
+            </a:r>
+          </a:p>
+          <a:p>
+            <a:r>
+              <a:rPr lang="en-US" sz="2400" dirty="0" smtClean="0"/>
+              <a:t>WPA</a:t>
+            </a:r>
+          </a:p>
+          <a:p>
+            <a:pPr lvl="1"/>
+            <a:r>
+              <a:rPr lang="en-US" dirty="0" smtClean="0"/>
+              <a:t>Cracking WPA (Dictionary based attack)</a:t>
+            </a:r>
+          </a:p>
+          <a:p>
+            <a:r>
+              <a:rPr lang="en-US" dirty="0" smtClean="0"/>
+              <a:t>WPA2</a:t>
+            </a:r>
+          </a:p>
+          <a:p>
+            <a:pPr lvl="1"/>
+            <a:r>
+              <a:rPr lang="en-US" dirty="0" smtClean="0"/>
+              <a:t>Home use – shared key</a:t>
+            </a:r>
+          </a:p>
+          <a:p>
+            <a:r>
+              <a:rPr lang="en-US" dirty="0" smtClean="0"/>
+              <a:t>WPA Enterprise (aka 802.11x)</a:t>
+            </a:r>
+          </a:p>
+          <a:p>
+            <a:endParaRPr lang="en-US" dirty="0"/>
+          </a:p>
+        </p:txBody>
+      </p:sp>
+    </p:spTree>
+    <p:extLst>
+      <p:ext uri="{BB962C8B-B14F-4D97-AF65-F5344CB8AC3E}">
+        <p14:creationId xmlns:p14="http://schemas.microsoft.com/office/powerpoint/2010/main" val="1228962205"/>
+      </p:ext>
+    </p:extLst>
+  </p:cSld>
+  <p:clrMapOvr>
+    <a:masterClrMapping/>
+  </p:clrMapOvr>
+  <p:timing>
+    <p:tnLst>
+      <p:par>
+        <p:cTn id="1" dur="indefinite" restart="never" nodeType="tmRoot"/>
+      </p:par>
+    </p:tnLst>
+  </p:timing>
 </p:sld>
 </file>
 
@@ -8096,7 +8432,6 @@
               <a:rPr lang="en-US" dirty="0" smtClean="0"/>
               <a:t>Open standards framework to help ensure private, secure communications over IP protocol through cryptographic services</a:t>
             </a:r>
-            <a:endParaRPr lang="en-US" dirty="0" smtClean="0"/>
           </a:p>
           <a:p>
             <a:pPr lvl="1"/>
@@ -8337,8 +8672,20 @@
           <a:p>
             <a:r>
               <a:rPr lang="en-US" dirty="0" smtClean="0"/>
-              <a:t>Approved applications</a:t>
-            </a:r>
+              <a:t>Approved </a:t>
+            </a:r>
+            <a:r>
+              <a:rPr lang="en-US" dirty="0" smtClean="0"/>
+              <a:t>applications</a:t>
+            </a:r>
+          </a:p>
+          <a:p>
+            <a:pPr lvl="1"/>
+            <a:r>
+              <a:rPr lang="en-US" dirty="0" smtClean="0"/>
+              <a:t>Enterprise management of permissible applications</a:t>
+            </a:r>
+            <a:endParaRPr lang="en-US" dirty="0" smtClean="0"/>
           </a:p>
           <a:p>
             <a:pPr lvl="1"/>
@@ -8352,6 +8699,19 @@
               <a:rPr lang="en-US" dirty="0" smtClean="0"/>
               <a:t>HTTPS</a:t>
             </a:r>
+          </a:p>
+          <a:p>
+            <a:r>
+              <a:rPr lang="en-US" dirty="0" smtClean="0"/>
+              <a:t>TLS</a:t>
+            </a:r>
+          </a:p>
+          <a:p>
+            <a:r>
+              <a:rPr lang="en-US" dirty="0" smtClean="0"/>
+              <a:t>S/MIME</a:t>
+            </a:r>
+            <a:endParaRPr lang="en-US" dirty="0" smtClean="0"/>
           </a:p>
           <a:p>
             <a:endParaRPr lang="en-US" dirty="0" smtClean="0"/>

</xml_diff>